<commit_message>
add TP_graph_of_R, tweak slides3m
</commit_message>
<xml_diff>
--- a/spring11/slides11/slides3m.pptx
+++ b/spring11/slides11/slides3m.pptx
@@ -1000,7 +1000,7 @@
           <a:bodyPr/>
           <a:lstStyle/>
           <a:p>
-            <a:endParaRPr lang="en-US"/>
+            <a:endParaRPr lang="en-US" dirty="0"/>
           </a:p>
         </p:txBody>
       </p:sp>
@@ -8795,6 +8795,20 @@
               </a:rPr>
               <a:t>Sets &amp;</a:t>
             </a:r>
+            <a:endParaRPr kumimoji="0" lang="en-US" sz="8000" b="0" i="0" u="none" strike="noStrike" kern="0" cap="none" spc="0" normalizeH="0" baseline="0" noProof="0" dirty="0" smtClean="0">
+              <a:ln>
+                <a:noFill/>
+              </a:ln>
+              <a:solidFill>
+                <a:schemeClr val="tx2"/>
+              </a:solidFill>
+              <a:effectLst/>
+              <a:uLnTx/>
+              <a:uFillTx/>
+              <a:latin typeface="Comic Sans MS" pitchFamily="66" charset="0"/>
+              <a:ea typeface="+mj-ea"/>
+              <a:cs typeface="+mj-cs"/>
+            </a:endParaRPr>
           </a:p>
           <a:p>
             <a:pPr marL="0" marR="0" lvl="0" indent="0" algn="ctr" defTabSz="914400" rtl="0" eaLnBrk="1" fontAlgn="base" latinLnBrk="0" hangingPunct="1">
@@ -8815,7 +8829,7 @@
               <a:defRPr/>
             </a:pPr>
             <a:r>
-              <a:rPr lang="en-US" sz="8000" kern="0" smtClean="0">
+              <a:rPr lang="en-US" sz="8000" kern="0" dirty="0" smtClean="0">
                 <a:solidFill>
                   <a:schemeClr val="tx2"/>
                 </a:solidFill>
@@ -8823,7 +8837,7 @@
                 <a:ea typeface="+mj-ea"/>
                 <a:cs typeface="+mj-cs"/>
               </a:rPr>
-              <a:t>Functions</a:t>
+              <a:t>Relations</a:t>
             </a:r>
             <a:endParaRPr kumimoji="0" lang="en-US" sz="8000" b="0" i="0" u="none" strike="noStrike" kern="0" cap="none" spc="0" normalizeH="0" baseline="0" noProof="0" dirty="0">
               <a:ln>

</xml_diff>